<commit_message>
Added complete suite of dummy screens.  Started Utility buildout.
</commit_message>
<xml_diff>
--- a/mmdb/misc/gd2-mlb-banner.pptx
+++ b/mmdb/misc/gd2-mlb-banner.pptx
@@ -2973,14 +2973,14 @@
         <p:nvSpPr>
           <p:cNvPr id="4" name="Rectangle 3"/>
           <p:cNvSpPr>
-            <a:spLocks noChangeAspect="1"/>
+            <a:spLocks/>
           </p:cNvSpPr>
           <p:nvPr/>
         </p:nvSpPr>
         <p:spPr>
           <a:xfrm>
-            <a:off x="4024863" y="1857908"/>
-            <a:ext cx="3730752" cy="393192"/>
+            <a:off x="4739237" y="1219733"/>
+            <a:ext cx="3468138" cy="396342"/>
           </a:xfrm>
           <a:prstGeom prst="rect">
             <a:avLst/>
@@ -2988,6 +2988,11 @@
           <a:solidFill>
             <a:srgbClr val="1E1E1E"/>
           </a:solidFill>
+          <a:ln>
+            <a:solidFill>
+              <a:srgbClr val="1E1E1E"/>
+            </a:solidFill>
+          </a:ln>
         </p:spPr>
         <p:style>
           <a:lnRef idx="2">
@@ -3018,14 +3023,14 @@
         <p:nvSpPr>
           <p:cNvPr id="5" name="Chevron 4"/>
           <p:cNvSpPr>
-            <a:spLocks noChangeAspect="1"/>
+            <a:spLocks/>
           </p:cNvSpPr>
           <p:nvPr/>
         </p:nvSpPr>
         <p:spPr>
           <a:xfrm>
-            <a:off x="4179004" y="1956206"/>
-            <a:ext cx="3422469" cy="196596"/>
+            <a:off x="4882528" y="1318818"/>
+            <a:ext cx="3181556" cy="198171"/>
           </a:xfrm>
           <a:prstGeom prst="chevron">
             <a:avLst/>
@@ -3061,7 +3066,7 @@
           <a:p>
             <a:pPr algn="ctr"/>
             <a:r>
-              <a:rPr lang="en-US" sz="1200" b="1" spc="1200" dirty="0" smtClean="0">
+              <a:rPr lang="en-US" sz="1000" b="1" spc="1200" dirty="0" smtClean="0">
                 <a:solidFill>
                   <a:srgbClr val="6AFF66"/>
                 </a:solidFill>
@@ -3069,7 +3074,7 @@
               </a:rPr>
               <a:t> download</a:t>
             </a:r>
-            <a:endParaRPr lang="en-US" sz="5400" b="1" spc="1200" dirty="0">
+            <a:endParaRPr lang="en-US" sz="4000" b="1" spc="1200" dirty="0">
               <a:solidFill>
                 <a:srgbClr val="6AFF66"/>
               </a:solidFill>
@@ -3082,14 +3087,14 @@
         <p:nvSpPr>
           <p:cNvPr id="9" name="Rectangle 8"/>
           <p:cNvSpPr>
-            <a:spLocks noChangeAspect="1"/>
+            <a:spLocks/>
           </p:cNvSpPr>
           <p:nvPr/>
         </p:nvSpPr>
         <p:spPr>
           <a:xfrm>
-            <a:off x="4024863" y="2349398"/>
-            <a:ext cx="3730752" cy="393192"/>
+            <a:off x="4739237" y="1840052"/>
+            <a:ext cx="3468138" cy="393192"/>
           </a:xfrm>
           <a:prstGeom prst="rect">
             <a:avLst/>
@@ -3097,6 +3102,11 @@
           <a:solidFill>
             <a:srgbClr val="1E1E1E"/>
           </a:solidFill>
+          <a:ln>
+            <a:solidFill>
+              <a:srgbClr val="1E1E1E"/>
+            </a:solidFill>
+          </a:ln>
         </p:spPr>
         <p:style>
           <a:lnRef idx="2">
@@ -3127,14 +3137,14 @@
         <p:nvSpPr>
           <p:cNvPr id="10" name="Chevron 9"/>
           <p:cNvSpPr>
-            <a:spLocks noChangeAspect="1"/>
+            <a:spLocks/>
           </p:cNvSpPr>
           <p:nvPr/>
         </p:nvSpPr>
         <p:spPr>
           <a:xfrm>
-            <a:off x="4179004" y="2447696"/>
-            <a:ext cx="3422469" cy="196596"/>
+            <a:off x="4882528" y="1938350"/>
+            <a:ext cx="3182112" cy="196596"/>
           </a:xfrm>
           <a:prstGeom prst="chevron">
             <a:avLst/>
@@ -3170,7 +3180,7 @@
           <a:p>
             <a:pPr algn="ctr"/>
             <a:r>
-              <a:rPr lang="en-US" sz="1200" spc="1200" dirty="0" smtClean="0">
+              <a:rPr lang="en-US" sz="1000" spc="1200" dirty="0" smtClean="0">
                 <a:solidFill>
                   <a:srgbClr val="787878"/>
                 </a:solidFill>
@@ -3178,7 +3188,7 @@
               </a:rPr>
               <a:t> download</a:t>
             </a:r>
-            <a:endParaRPr lang="en-US" sz="5400" spc="1200" dirty="0">
+            <a:endParaRPr lang="en-US" sz="1000" spc="1200" dirty="0">
               <a:solidFill>
                 <a:srgbClr val="787878"/>
               </a:solidFill>
@@ -3191,14 +3201,14 @@
         <p:nvSpPr>
           <p:cNvPr id="11" name="Rectangle 10"/>
           <p:cNvSpPr>
-            <a:spLocks noChangeAspect="1"/>
+            <a:spLocks/>
           </p:cNvSpPr>
           <p:nvPr/>
         </p:nvSpPr>
         <p:spPr>
           <a:xfrm>
-            <a:off x="4024863" y="2840888"/>
-            <a:ext cx="3730752" cy="393192"/>
+            <a:off x="4739237" y="2506370"/>
+            <a:ext cx="3468138" cy="393192"/>
           </a:xfrm>
           <a:prstGeom prst="rect">
             <a:avLst/>
@@ -3206,6 +3216,11 @@
           <a:solidFill>
             <a:srgbClr val="1E1E1E"/>
           </a:solidFill>
+          <a:ln>
+            <a:solidFill>
+              <a:srgbClr val="1E1E1E"/>
+            </a:solidFill>
+          </a:ln>
         </p:spPr>
         <p:style>
           <a:lnRef idx="2">
@@ -3236,14 +3251,14 @@
         <p:nvSpPr>
           <p:cNvPr id="12" name="Chevron 11"/>
           <p:cNvSpPr>
-            <a:spLocks noChangeAspect="1"/>
+            <a:spLocks/>
           </p:cNvSpPr>
           <p:nvPr/>
         </p:nvSpPr>
         <p:spPr>
           <a:xfrm>
-            <a:off x="4179004" y="2939186"/>
-            <a:ext cx="3422469" cy="196596"/>
+            <a:off x="4881972" y="2599997"/>
+            <a:ext cx="3182112" cy="196596"/>
           </a:xfrm>
           <a:prstGeom prst="chevron">
             <a:avLst/>
@@ -3279,7 +3294,7 @@
           <a:p>
             <a:pPr algn="ctr"/>
             <a:r>
-              <a:rPr lang="en-US" sz="1200" b="1" spc="1200" dirty="0" smtClean="0">
+              <a:rPr lang="en-US" sz="1000" b="1" spc="1200" dirty="0" smtClean="0">
                 <a:solidFill>
                   <a:srgbClr val="6AFF66"/>
                 </a:solidFill>
@@ -3287,7 +3302,7 @@
               </a:rPr>
               <a:t> read</a:t>
             </a:r>
-            <a:endParaRPr lang="en-US" sz="5400" b="1" spc="1200" dirty="0">
+            <a:endParaRPr lang="en-US" sz="1000" b="1" spc="1200" dirty="0">
               <a:solidFill>
                 <a:srgbClr val="6AFF66"/>
               </a:solidFill>
@@ -3300,14 +3315,14 @@
         <p:nvSpPr>
           <p:cNvPr id="13" name="Rectangle 12"/>
           <p:cNvSpPr>
-            <a:spLocks noChangeAspect="1"/>
+            <a:spLocks/>
           </p:cNvSpPr>
           <p:nvPr/>
         </p:nvSpPr>
         <p:spPr>
           <a:xfrm>
-            <a:off x="4024863" y="3332378"/>
-            <a:ext cx="3730752" cy="393192"/>
+            <a:off x="4733590" y="3185176"/>
+            <a:ext cx="3465576" cy="393192"/>
           </a:xfrm>
           <a:prstGeom prst="rect">
             <a:avLst/>
@@ -3315,6 +3330,11 @@
           <a:solidFill>
             <a:srgbClr val="1E1E1E"/>
           </a:solidFill>
+          <a:ln>
+            <a:solidFill>
+              <a:srgbClr val="1E1E1E"/>
+            </a:solidFill>
+          </a:ln>
         </p:spPr>
         <p:style>
           <a:lnRef idx="2">
@@ -3345,14 +3365,14 @@
         <p:nvSpPr>
           <p:cNvPr id="14" name="Chevron 13"/>
           <p:cNvSpPr>
-            <a:spLocks noChangeAspect="1"/>
+            <a:spLocks/>
           </p:cNvSpPr>
           <p:nvPr/>
         </p:nvSpPr>
         <p:spPr>
           <a:xfrm>
-            <a:off x="4179004" y="3430676"/>
-            <a:ext cx="3422469" cy="196596"/>
+            <a:off x="4881972" y="3281272"/>
+            <a:ext cx="3182112" cy="196596"/>
           </a:xfrm>
           <a:prstGeom prst="chevron">
             <a:avLst/>
@@ -3388,7 +3408,7 @@
           <a:p>
             <a:pPr algn="ctr"/>
             <a:r>
-              <a:rPr lang="en-US" sz="1200" spc="1200" dirty="0" smtClean="0">
+              <a:rPr lang="en-US" sz="1000" spc="1200" dirty="0" smtClean="0">
                 <a:solidFill>
                   <a:srgbClr val="787878"/>
                 </a:solidFill>
@@ -3396,7 +3416,7 @@
               </a:rPr>
               <a:t> read</a:t>
             </a:r>
-            <a:endParaRPr lang="en-US" sz="5400" spc="1200" dirty="0">
+            <a:endParaRPr lang="en-US" sz="1000" spc="1200" dirty="0">
               <a:solidFill>
                 <a:srgbClr val="787878"/>
               </a:solidFill>
@@ -3409,14 +3429,14 @@
         <p:nvSpPr>
           <p:cNvPr id="15" name="Rectangle 14"/>
           <p:cNvSpPr>
-            <a:spLocks noChangeAspect="1"/>
+            <a:spLocks/>
           </p:cNvSpPr>
           <p:nvPr/>
         </p:nvSpPr>
         <p:spPr>
           <a:xfrm>
-            <a:off x="4024863" y="3822686"/>
-            <a:ext cx="3730752" cy="393192"/>
+            <a:off x="4733590" y="3859579"/>
+            <a:ext cx="3465576" cy="392263"/>
           </a:xfrm>
           <a:prstGeom prst="rect">
             <a:avLst/>
@@ -3424,6 +3444,11 @@
           <a:solidFill>
             <a:srgbClr val="1E1E1E"/>
           </a:solidFill>
+          <a:ln>
+            <a:solidFill>
+              <a:srgbClr val="1E1E1E"/>
+            </a:solidFill>
+          </a:ln>
         </p:spPr>
         <p:style>
           <a:lnRef idx="2">
@@ -3454,14 +3479,14 @@
         <p:nvSpPr>
           <p:cNvPr id="16" name="Chevron 15"/>
           <p:cNvSpPr>
-            <a:spLocks noChangeAspect="1"/>
+            <a:spLocks/>
           </p:cNvSpPr>
           <p:nvPr/>
         </p:nvSpPr>
         <p:spPr>
           <a:xfrm>
-            <a:off x="4179004" y="3920984"/>
-            <a:ext cx="3422469" cy="196596"/>
+            <a:off x="4881972" y="3957412"/>
+            <a:ext cx="3182112" cy="196596"/>
           </a:xfrm>
           <a:prstGeom prst="chevron">
             <a:avLst/>
@@ -3497,7 +3522,7 @@
           <a:p>
             <a:pPr algn="ctr"/>
             <a:r>
-              <a:rPr lang="en-US" sz="1200" b="1" spc="1200" dirty="0" smtClean="0">
+              <a:rPr lang="en-US" sz="1000" b="1" spc="1200" dirty="0" smtClean="0">
                 <a:solidFill>
                   <a:srgbClr val="6AFF66"/>
                 </a:solidFill>
@@ -3505,7 +3530,7 @@
               </a:rPr>
               <a:t> upload</a:t>
             </a:r>
-            <a:endParaRPr lang="en-US" sz="5400" b="1" spc="1200" dirty="0">
+            <a:endParaRPr lang="en-US" sz="1000" b="1" spc="1200" dirty="0">
               <a:solidFill>
                 <a:srgbClr val="6AFF66"/>
               </a:solidFill>
@@ -3518,14 +3543,14 @@
         <p:nvSpPr>
           <p:cNvPr id="17" name="Rectangle 16"/>
           <p:cNvSpPr>
-            <a:spLocks noChangeAspect="1"/>
+            <a:spLocks/>
           </p:cNvSpPr>
           <p:nvPr/>
         </p:nvSpPr>
         <p:spPr>
           <a:xfrm>
-            <a:off x="4024863" y="4314176"/>
-            <a:ext cx="3730752" cy="393192"/>
+            <a:off x="4733590" y="4716893"/>
+            <a:ext cx="3465576" cy="393192"/>
           </a:xfrm>
           <a:prstGeom prst="rect">
             <a:avLst/>
@@ -3533,6 +3558,11 @@
           <a:solidFill>
             <a:srgbClr val="1E1E1E"/>
           </a:solidFill>
+          <a:ln>
+            <a:solidFill>
+              <a:srgbClr val="1E1E1E"/>
+            </a:solidFill>
+          </a:ln>
         </p:spPr>
         <p:style>
           <a:lnRef idx="2">
@@ -3563,14 +3593,14 @@
         <p:nvSpPr>
           <p:cNvPr id="18" name="Chevron 17"/>
           <p:cNvSpPr>
-            <a:spLocks noChangeAspect="1"/>
+            <a:spLocks/>
           </p:cNvSpPr>
           <p:nvPr/>
         </p:nvSpPr>
         <p:spPr>
           <a:xfrm>
-            <a:off x="4179004" y="4412474"/>
-            <a:ext cx="3422469" cy="196596"/>
+            <a:off x="4881972" y="4815191"/>
+            <a:ext cx="3182112" cy="196596"/>
           </a:xfrm>
           <a:prstGeom prst="chevron">
             <a:avLst/>
@@ -3606,7 +3636,7 @@
           <a:p>
             <a:pPr algn="ctr"/>
             <a:r>
-              <a:rPr lang="en-US" sz="1200" spc="1200" dirty="0" smtClean="0">
+              <a:rPr lang="en-US" sz="1000" spc="1200" dirty="0" smtClean="0">
                 <a:solidFill>
                   <a:srgbClr val="787878"/>
                 </a:solidFill>
@@ -3614,7 +3644,7 @@
               </a:rPr>
               <a:t> upload</a:t>
             </a:r>
-            <a:endParaRPr lang="en-US" sz="5400" spc="1200" dirty="0">
+            <a:endParaRPr lang="en-US" sz="1000" spc="1200" dirty="0">
               <a:solidFill>
                 <a:srgbClr val="787878"/>
               </a:solidFill>

</xml_diff>